<commit_message>
Update ppt and github link to Roman Urdu
</commit_message>
<xml_diff>
--- a/assets/Roman Urdu Sentiment Identification.pptx
+++ b/assets/Roman Urdu Sentiment Identification.pptx
@@ -944,6 +944,109 @@
             </a:r>
           </a:p>
           <a:p>
+            <a:endParaRPr lang="en-US" dirty="0" smtClean="0"/>
+          </a:p>
+          <a:p>
+            <a:r>
+              <a:rPr lang="en-US" dirty="0" smtClean="0"/>
+              <a:t/>
+            </a:r>
+            <a:br>
+              <a:rPr lang="en-US" dirty="0" smtClean="0"/>
+            </a:br>
+            <a:r>
+              <a:rPr lang="en-US" sz="1200" b="0" i="0" kern="1200" dirty="0" smtClean="0">
+                <a:solidFill>
+                  <a:schemeClr val="tx1"/>
+                </a:solidFill>
+                <a:latin typeface="+mn-lt"/>
+                <a:ea typeface="+mn-ea"/>
+                <a:cs typeface="+mn-cs"/>
+              </a:rPr>
+              <a:t>A TF-IDF Vectorizer, which stands for Term Frequency-Inverse Document Frequency Vectorizer, is a text processing tool used in natural language processing and information retrieval. It transforms a collection of textual documents into a numerical format by representing each document as a vector. In this representation, each unique word or term in the corpus is assigned a numerical value based on its frequency within the document (Term Frequency) and its importance across the entire corpus (Inverse Document Frequency). TF-IDF assigns higher values to terms that are frequent within a document but relatively rare across all documents, allowing it to capture the importance of words in distinguishing one document from another. This </a:t>
+            </a:r>
+            <a:r>
+              <a:rPr lang="en-US" sz="1200" b="0" i="0" kern="1200" dirty="0" err="1" smtClean="0">
+                <a:solidFill>
+                  <a:schemeClr val="tx1"/>
+                </a:solidFill>
+                <a:latin typeface="+mn-lt"/>
+                <a:ea typeface="+mn-ea"/>
+                <a:cs typeface="+mn-cs"/>
+              </a:rPr>
+              <a:t>vectorization</a:t>
+            </a:r>
+            <a:r>
+              <a:rPr lang="en-US" sz="1200" b="0" i="0" kern="1200" dirty="0" smtClean="0">
+                <a:solidFill>
+                  <a:schemeClr val="tx1"/>
+                </a:solidFill>
+                <a:latin typeface="+mn-lt"/>
+                <a:ea typeface="+mn-ea"/>
+                <a:cs typeface="+mn-cs"/>
+              </a:rPr>
+              <a:t> technique is widely used in tasks such as text classification, document clustering, and information retrieval to convert unstructured text data into a format suitable for machine learning algorithms.</a:t>
+            </a:r>
+          </a:p>
+          <a:p>
+            <a:r>
+              <a:rPr lang="en-US" sz="1200" b="0" i="0" kern="1200" smtClean="0">
+                <a:solidFill>
+                  <a:schemeClr val="tx1"/>
+                </a:solidFill>
+                <a:latin typeface="+mn-lt"/>
+                <a:ea typeface="+mn-ea"/>
+                <a:cs typeface="+mn-cs"/>
+              </a:rPr>
+              <a:t>Formulas:</a:t>
+            </a:r>
+            <a:endParaRPr lang="en-US" sz="1200" b="0" i="0" kern="1200" dirty="0" smtClean="0">
+              <a:solidFill>
+                <a:schemeClr val="tx1"/>
+              </a:solidFill>
+              <a:latin typeface="+mn-lt"/>
+              <a:ea typeface="+mn-ea"/>
+              <a:cs typeface="+mn-cs"/>
+            </a:endParaRPr>
+          </a:p>
+          <a:p>
+            <a:r>
+              <a:rPr lang="en-US" sz="1200" b="0" i="0" kern="1200" dirty="0" smtClean="0">
+                <a:solidFill>
+                  <a:schemeClr val="tx1"/>
+                </a:solidFill>
+                <a:latin typeface="+mn-lt"/>
+                <a:ea typeface="+mn-ea"/>
+                <a:cs typeface="+mn-cs"/>
+              </a:rPr>
+              <a:t>TF(t, d) = (Number of times term t appears in document d) / (Total number of terms in document d)</a:t>
+            </a:r>
+          </a:p>
+          <a:p>
+            <a:r>
+              <a:rPr lang="en-US" sz="1200" b="0" i="0" kern="1200" dirty="0" smtClean="0">
+                <a:solidFill>
+                  <a:schemeClr val="tx1"/>
+                </a:solidFill>
+                <a:latin typeface="+mn-lt"/>
+                <a:ea typeface="+mn-ea"/>
+                <a:cs typeface="+mn-cs"/>
+              </a:rPr>
+              <a:t>IDF(t) = log(N / (Number of documents containing term t))</a:t>
+            </a:r>
+          </a:p>
+          <a:p>
+            <a:r>
+              <a:rPr lang="en-US" sz="1200" b="0" i="0" kern="1200" dirty="0" smtClean="0">
+                <a:solidFill>
+                  <a:schemeClr val="tx1"/>
+                </a:solidFill>
+                <a:latin typeface="+mn-lt"/>
+                <a:ea typeface="+mn-ea"/>
+                <a:cs typeface="+mn-cs"/>
+              </a:rPr>
+              <a:t>TF-IDF(t, d) = TF(t, d) * IDF(t)</a:t>
+            </a:r>
             <a:endParaRPr lang="en-US" dirty="0"/>
           </a:p>
         </p:txBody>
@@ -1473,6 +1576,7 @@
           <a:p>
             <a:fld id="{CA631471-81C9-4C17-8678-09E21B123DC6}" type="datetime1">
               <a:rPr lang="en-US" smtClean="0"/>
+              <a:pPr/>
               <a:t>12/21/2023</a:t>
             </a:fld>
             <a:endParaRPr lang="en-US"/>
@@ -1787,6 +1891,7 @@
           <a:p>
             <a:fld id="{7F27CCFD-DD7B-44F5-851E-E843F9ED5033}" type="datetime1">
               <a:rPr lang="en-US" smtClean="0"/>
+              <a:pPr/>
               <a:t>12/21/2023</a:t>
             </a:fld>
             <a:endParaRPr lang="en-US"/>
@@ -1973,6 +2078,7 @@
           <a:p>
             <a:fld id="{95458C6D-38E2-4C89-A53D-F8486ACAF87F}" type="datetime1">
               <a:rPr lang="en-US" smtClean="0"/>
+              <a:pPr/>
               <a:t>12/21/2023</a:t>
             </a:fld>
             <a:endParaRPr lang="en-US"/>
@@ -2149,6 +2255,7 @@
           <a:p>
             <a:fld id="{8ACAEA30-E193-4F74-878E-F26C3E918DC3}" type="datetime1">
               <a:rPr lang="en-US" smtClean="0"/>
+              <a:pPr/>
               <a:t>12/21/2023</a:t>
             </a:fld>
             <a:endParaRPr lang="en-US"/>
@@ -2418,6 +2525,7 @@
           <a:p>
             <a:fld id="{95397BA9-92E0-4598-A4BD-B2C6A8C7BE99}" type="datetime1">
               <a:rPr lang="en-US" smtClean="0"/>
+              <a:pPr/>
               <a:t>12/21/2023</a:t>
             </a:fld>
             <a:endParaRPr lang="en-US"/>
@@ -2887,6 +2995,7 @@
           <a:p>
             <a:fld id="{B70F2116-27FA-42D1-B1D0-257DF9DA3F2D}" type="datetime1">
               <a:rPr lang="en-US" smtClean="0"/>
+              <a:pPr/>
               <a:t>12/21/2023</a:t>
             </a:fld>
             <a:endParaRPr lang="en-US"/>
@@ -3377,6 +3486,7 @@
           <a:p>
             <a:fld id="{8A997C7D-5A96-41DE-B2FC-A0B888A09778}" type="datetime1">
               <a:rPr lang="en-US" smtClean="0"/>
+              <a:pPr/>
               <a:t>12/21/2023</a:t>
             </a:fld>
             <a:endParaRPr lang="en-US"/>
@@ -3504,6 +3614,7 @@
           <a:p>
             <a:fld id="{DE218ED6-9E4D-44DE-9089-2C3A566105F6}" type="datetime1">
               <a:rPr lang="en-US" smtClean="0"/>
+              <a:pPr/>
               <a:t>12/21/2023</a:t>
             </a:fld>
             <a:endParaRPr lang="en-US"/>
@@ -3649,6 +3760,7 @@
           <a:p>
             <a:fld id="{82950C6A-8E44-4BD8-A4B0-E160A775DF35}" type="datetime1">
               <a:rPr lang="en-US" smtClean="0"/>
+              <a:pPr/>
               <a:t>12/21/2023</a:t>
             </a:fld>
             <a:endParaRPr lang="en-US"/>
@@ -3972,6 +4084,7 @@
           <a:p>
             <a:fld id="{379005D7-6415-448C-9D45-7C649F2A67CA}" type="datetime1">
               <a:rPr lang="en-US" smtClean="0"/>
+              <a:pPr/>
               <a:t>12/21/2023</a:t>
             </a:fld>
             <a:endParaRPr lang="en-US"/>
@@ -4107,6 +4220,7 @@
           <a:p>
             <a:fld id="{1E6D3416-FCEA-40AE-832F-0F9CC0B1024F}" type="datetime1">
               <a:rPr lang="en-US" smtClean="0"/>
+              <a:pPr/>
               <a:t>12/21/2023</a:t>
             </a:fld>
             <a:endParaRPr lang="en-US"/>
@@ -4889,6 +5003,7 @@
           <a:p>
             <a:fld id="{8492EFF9-DA9D-486B-A42C-2A799EE08F6C}" type="datetime1">
               <a:rPr lang="en-US" smtClean="0"/>
+              <a:pPr/>
               <a:t>12/21/2023</a:t>
             </a:fld>
             <a:endParaRPr lang="en-US"/>
@@ -5487,7 +5602,7 @@
         </p:blipFill>
         <p:spPr bwMode="auto">
           <a:xfrm>
-            <a:off x="7772401" y="4743451"/>
+            <a:off x="7772400" y="209550"/>
             <a:ext cx="1199211" cy="271463"/>
           </a:xfrm>
           <a:prstGeom prst="rect">
@@ -5689,6 +5804,32 @@
           </a:p>
         </p:txBody>
       </p:sp>
+      <p:pic>
+        <p:nvPicPr>
+          <p:cNvPr id="7" name="Picture 2" descr="File:Amazon logo.svg"/>
+          <p:cNvPicPr>
+            <a:picLocks noChangeAspect="1" noChangeArrowheads="1"/>
+          </p:cNvPicPr>
+          <p:nvPr/>
+        </p:nvPicPr>
+        <p:blipFill>
+          <a:blip r:embed="rId4" cstate="print"/>
+          <a:srcRect/>
+          <a:stretch>
+            <a:fillRect/>
+          </a:stretch>
+        </p:blipFill>
+        <p:spPr bwMode="auto">
+          <a:xfrm>
+            <a:off x="7772400" y="209550"/>
+            <a:ext cx="1199211" cy="271463"/>
+          </a:xfrm>
+          <a:prstGeom prst="rect">
+            <a:avLst/>
+          </a:prstGeom>
+          <a:noFill/>
+        </p:spPr>
+      </p:pic>
     </p:spTree>
   </p:cSld>
   <p:clrMapOvr>
@@ -5830,6 +5971,32 @@
           </a:p>
         </p:txBody>
       </p:sp>
+      <p:pic>
+        <p:nvPicPr>
+          <p:cNvPr id="5" name="Picture 2" descr="File:Amazon logo.svg"/>
+          <p:cNvPicPr>
+            <a:picLocks noChangeAspect="1" noChangeArrowheads="1"/>
+          </p:cNvPicPr>
+          <p:nvPr/>
+        </p:nvPicPr>
+        <p:blipFill>
+          <a:blip r:embed="rId2" cstate="print"/>
+          <a:srcRect/>
+          <a:stretch>
+            <a:fillRect/>
+          </a:stretch>
+        </p:blipFill>
+        <p:spPr bwMode="auto">
+          <a:xfrm>
+            <a:off x="7772400" y="209550"/>
+            <a:ext cx="1199211" cy="271463"/>
+          </a:xfrm>
+          <a:prstGeom prst="rect">
+            <a:avLst/>
+          </a:prstGeom>
+          <a:noFill/>
+        </p:spPr>
+      </p:pic>
     </p:spTree>
   </p:cSld>
   <p:clrMapOvr>
@@ -5896,20 +6063,12 @@
           <a:lstStyle/>
           <a:p>
             <a:r>
+              <a:rPr lang="en-US" i="1" dirty="0" smtClean="0"/>
+              <a:t>Roman Urdu</a:t>
+            </a:r>
+            <a:r>
               <a:rPr lang="en-US" dirty="0" smtClean="0"/>
-              <a:t>Roman Urdu, while not currently </a:t>
-            </a:r>
-            <a:r>
-              <a:rPr lang="en-US" dirty="0" smtClean="0"/>
-              <a:t>well supported by language services, </a:t>
-            </a:r>
-            <a:r>
-              <a:rPr lang="en-US" dirty="0" smtClean="0"/>
-              <a:t>can be successfully </a:t>
-            </a:r>
-            <a:r>
-              <a:rPr lang="en-US" dirty="0" smtClean="0"/>
-              <a:t>modeled when used with AI-powered large language models.</a:t>
+              <a:t>, while not currently well supported by language services, can be successfully modeled when used with AI-powered large language models.</a:t>
             </a:r>
           </a:p>
           <a:p>
@@ -5927,13 +6086,16 @@
           <a:p>
             <a:r>
               <a:rPr lang="en-US" dirty="0" smtClean="0"/>
-              <a:t>A binary Negative Sentiment detection model </a:t>
+              <a:t>A binary Negative Sentiment detection model has higher accuracy for the same </a:t>
             </a:r>
             <a:r>
               <a:rPr lang="en-US" dirty="0" smtClean="0"/>
-              <a:t>has higher accuracy for the same set of data than its multiclass counterpart.</a:t>
-            </a:r>
-            <a:endParaRPr lang="en-US" dirty="0" smtClean="0"/>
+              <a:t>amount </a:t>
+            </a:r>
+            <a:r>
+              <a:rPr lang="en-US" dirty="0" smtClean="0"/>
+              <a:t>of data than its multiclass counterpart.</a:t>
+            </a:r>
           </a:p>
           <a:p>
             <a:endParaRPr lang="en-US" dirty="0"/>
@@ -5964,6 +6126,32 @@
           </a:p>
         </p:txBody>
       </p:sp>
+      <p:pic>
+        <p:nvPicPr>
+          <p:cNvPr id="5" name="Picture 2" descr="File:Amazon logo.svg"/>
+          <p:cNvPicPr>
+            <a:picLocks noChangeAspect="1" noChangeArrowheads="1"/>
+          </p:cNvPicPr>
+          <p:nvPr/>
+        </p:nvPicPr>
+        <p:blipFill>
+          <a:blip r:embed="rId2" cstate="print"/>
+          <a:srcRect/>
+          <a:stretch>
+            <a:fillRect/>
+          </a:stretch>
+        </p:blipFill>
+        <p:spPr bwMode="auto">
+          <a:xfrm>
+            <a:off x="7772400" y="209550"/>
+            <a:ext cx="1199211" cy="271463"/>
+          </a:xfrm>
+          <a:prstGeom prst="rect">
+            <a:avLst/>
+          </a:prstGeom>
+          <a:noFill/>
+        </p:spPr>
+      </p:pic>
     </p:spTree>
   </p:cSld>
   <p:clrMapOvr>
@@ -6065,15 +6253,7 @@
             </a:pPr>
             <a:r>
               <a:rPr lang="en-US" dirty="0" smtClean="0"/>
-              <a:t>The simplified binary Negative </a:t>
-            </a:r>
-            <a:r>
-              <a:rPr lang="en-US" dirty="0" smtClean="0"/>
-              <a:t>Sentiment detection </a:t>
-            </a:r>
-            <a:r>
-              <a:rPr lang="en-US" dirty="0" smtClean="0"/>
-              <a:t>model requires less data to be accurate. </a:t>
+              <a:t>The simplified binary Negative Sentiment detection model requires less data to be accurate. </a:t>
             </a:r>
             <a:endParaRPr lang="en-US" dirty="0"/>
           </a:p>
@@ -6103,6 +6283,32 @@
           </a:p>
         </p:txBody>
       </p:sp>
+      <p:pic>
+        <p:nvPicPr>
+          <p:cNvPr id="5" name="Picture 2" descr="File:Amazon logo.svg"/>
+          <p:cNvPicPr>
+            <a:picLocks noChangeAspect="1" noChangeArrowheads="1"/>
+          </p:cNvPicPr>
+          <p:nvPr/>
+        </p:nvPicPr>
+        <p:blipFill>
+          <a:blip r:embed="rId2" cstate="print"/>
+          <a:srcRect/>
+          <a:stretch>
+            <a:fillRect/>
+          </a:stretch>
+        </p:blipFill>
+        <p:spPr bwMode="auto">
+          <a:xfrm>
+            <a:off x="7772400" y="209550"/>
+            <a:ext cx="1199211" cy="271463"/>
+          </a:xfrm>
+          <a:prstGeom prst="rect">
+            <a:avLst/>
+          </a:prstGeom>
+          <a:noFill/>
+        </p:spPr>
+      </p:pic>
     </p:spTree>
   </p:cSld>
   <p:clrMapOvr>
@@ -6273,11 +6479,7 @@
             </a:r>
             <a:r>
               <a:rPr lang="en-US" dirty="0" smtClean="0"/>
-              <a:t> </a:t>
-            </a:r>
-            <a:r>
-              <a:rPr lang="en-US" dirty="0" smtClean="0"/>
-              <a:t>and </a:t>
+              <a:t> and </a:t>
             </a:r>
             <a:r>
               <a:rPr lang="en-US" i="1" dirty="0" smtClean="0"/>
@@ -6285,13 +6487,8 @@
             </a:r>
             <a:r>
               <a:rPr lang="en-US" dirty="0" smtClean="0"/>
-              <a:t> </a:t>
-            </a:r>
-            <a:r>
-              <a:rPr lang="en-US" dirty="0" smtClean="0"/>
-              <a:t>are distinct languages. </a:t>
-            </a:r>
-            <a:endParaRPr lang="en-US" dirty="0" smtClean="0"/>
+              <a:t> are distinct languages. </a:t>
+            </a:r>
           </a:p>
           <a:p>
             <a:pPr marL="870966" lvl="1" indent="-514350"/>
@@ -6307,29 +6504,12 @@
               <a:rPr lang="en-US" dirty="0" smtClean="0"/>
               <a:t> wasn’t supported. </a:t>
             </a:r>
-            <a:endParaRPr lang="en-US" dirty="0" smtClean="0"/>
           </a:p>
           <a:p>
             <a:pPr marL="596646" indent="-514350"/>
             <a:r>
               <a:rPr lang="en-US" dirty="0" smtClean="0"/>
-              <a:t>The </a:t>
-            </a:r>
-            <a:r>
-              <a:rPr lang="en-US" dirty="0" smtClean="0"/>
-              <a:t>chart on the right shows that no </a:t>
-            </a:r>
-            <a:r>
-              <a:rPr lang="en-US" dirty="0" smtClean="0"/>
-              <a:t>tradeoff exists </a:t>
-            </a:r>
-            <a:r>
-              <a:rPr lang="en-US" dirty="0" smtClean="0"/>
-              <a:t>between total accuracy and negative sentiment </a:t>
-            </a:r>
-            <a:r>
-              <a:rPr lang="en-US" dirty="0" smtClean="0"/>
-              <a:t>accuracy when adjusting </a:t>
+              <a:t>The chart on the right shows that no tradeoff exists between total accuracy and negative sentiment accuracy when adjusting </a:t>
             </a:r>
             <a:r>
               <a:rPr lang="en-US" dirty="0" err="1" smtClean="0"/>
@@ -6344,15 +6524,7 @@
             <a:pPr marL="870966" lvl="1" indent="-514350"/>
             <a:r>
               <a:rPr lang="en-US" dirty="0" smtClean="0"/>
-              <a:t>In </a:t>
-            </a:r>
-            <a:r>
-              <a:rPr lang="en-US" dirty="0" smtClean="0"/>
-              <a:t>fact </a:t>
-            </a:r>
-            <a:r>
-              <a:rPr lang="en-US" dirty="0" smtClean="0"/>
-              <a:t>adjusting the </a:t>
+              <a:t>In fact adjusting the </a:t>
             </a:r>
             <a:r>
               <a:rPr lang="en-US" dirty="0" err="1" smtClean="0"/>
@@ -6360,23 +6532,7 @@
             </a:r>
             <a:r>
               <a:rPr lang="en-US" dirty="0" smtClean="0"/>
-              <a:t> </a:t>
-            </a:r>
-            <a:r>
-              <a:rPr lang="en-US" dirty="0" smtClean="0"/>
-              <a:t>even gave a slight boost to both Accuracy measures </a:t>
-            </a:r>
-            <a:r>
-              <a:rPr lang="en-US" dirty="0" smtClean="0"/>
-              <a:t>before </a:t>
-            </a:r>
-            <a:r>
-              <a:rPr lang="en-US" dirty="0" smtClean="0"/>
-              <a:t>both began to degrade </a:t>
-            </a:r>
-            <a:r>
-              <a:rPr lang="en-US" dirty="0" smtClean="0"/>
-              <a:t>after Negative Sentiment exceeded a </a:t>
+              <a:t> even gave a slight boost to both Accuracy measures before both began to degrade after Negative Sentiment exceeded a </a:t>
             </a:r>
             <a:r>
               <a:rPr lang="en-US" dirty="0" err="1" smtClean="0"/>
@@ -6386,7 +6542,6 @@
               <a:rPr lang="en-US" dirty="0" smtClean="0"/>
               <a:t> value of 1.2. </a:t>
             </a:r>
-            <a:endParaRPr lang="en-US" dirty="0" smtClean="0"/>
           </a:p>
           <a:p>
             <a:pPr marL="870966" lvl="1" indent="-514350"/>
@@ -6465,6 +6620,32 @@
           </a:p>
         </p:txBody>
       </p:sp>
+      <p:pic>
+        <p:nvPicPr>
+          <p:cNvPr id="6" name="Picture 2" descr="File:Amazon logo.svg"/>
+          <p:cNvPicPr>
+            <a:picLocks noChangeAspect="1" noChangeArrowheads="1"/>
+          </p:cNvPicPr>
+          <p:nvPr/>
+        </p:nvPicPr>
+        <p:blipFill>
+          <a:blip r:embed="rId4" cstate="print"/>
+          <a:srcRect/>
+          <a:stretch>
+            <a:fillRect/>
+          </a:stretch>
+        </p:blipFill>
+        <p:spPr bwMode="auto">
+          <a:xfrm>
+            <a:off x="7772400" y="209550"/>
+            <a:ext cx="1199211" cy="271463"/>
+          </a:xfrm>
+          <a:prstGeom prst="rect">
+            <a:avLst/>
+          </a:prstGeom>
+          <a:noFill/>
+        </p:spPr>
+      </p:pic>
     </p:spTree>
   </p:cSld>
   <p:clrMapOvr>
@@ -6603,6 +6784,32 @@
           </a:p>
         </p:txBody>
       </p:sp>
+      <p:pic>
+        <p:nvPicPr>
+          <p:cNvPr id="5" name="Picture 2" descr="File:Amazon logo.svg"/>
+          <p:cNvPicPr>
+            <a:picLocks noChangeAspect="1" noChangeArrowheads="1"/>
+          </p:cNvPicPr>
+          <p:nvPr/>
+        </p:nvPicPr>
+        <p:blipFill>
+          <a:blip r:embed="rId2" cstate="print"/>
+          <a:srcRect/>
+          <a:stretch>
+            <a:fillRect/>
+          </a:stretch>
+        </p:blipFill>
+        <p:spPr bwMode="auto">
+          <a:xfrm>
+            <a:off x="7772400" y="209550"/>
+            <a:ext cx="1199211" cy="271463"/>
+          </a:xfrm>
+          <a:prstGeom prst="rect">
+            <a:avLst/>
+          </a:prstGeom>
+          <a:noFill/>
+        </p:spPr>
+      </p:pic>
     </p:spTree>
   </p:cSld>
   <p:clrMapOvr>
@@ -6794,6 +7001,32 @@
           </a:p>
         </p:txBody>
       </p:sp>
+      <p:pic>
+        <p:nvPicPr>
+          <p:cNvPr id="5" name="Picture 2" descr="File:Amazon logo.svg"/>
+          <p:cNvPicPr>
+            <a:picLocks noChangeAspect="1" noChangeArrowheads="1"/>
+          </p:cNvPicPr>
+          <p:nvPr/>
+        </p:nvPicPr>
+        <p:blipFill>
+          <a:blip r:embed="rId2" cstate="print"/>
+          <a:srcRect/>
+          <a:stretch>
+            <a:fillRect/>
+          </a:stretch>
+        </p:blipFill>
+        <p:spPr bwMode="auto">
+          <a:xfrm>
+            <a:off x="7772400" y="209550"/>
+            <a:ext cx="1199211" cy="271463"/>
+          </a:xfrm>
+          <a:prstGeom prst="rect">
+            <a:avLst/>
+          </a:prstGeom>
+          <a:noFill/>
+        </p:spPr>
+      </p:pic>
     </p:spTree>
   </p:cSld>
   <p:clrMapOvr>
@@ -6905,11 +7138,7 @@
             <a:pPr lvl="1"/>
             <a:r>
               <a:rPr lang="en-US" dirty="0" smtClean="0"/>
-              <a:t>Provided data </a:t>
-            </a:r>
-            <a:r>
-              <a:rPr lang="en-US" dirty="0" smtClean="0"/>
-              <a:t>is contaminated and requires processing.</a:t>
+              <a:t>Provided data is contaminated and requires processing.</a:t>
             </a:r>
           </a:p>
           <a:p>
@@ -6932,9 +7161,33 @@
           </a:p>
         </p:txBody>
       </p:sp>
+      <p:sp>
+        <p:nvSpPr>
+          <p:cNvPr id="5" name="Slide Number Placeholder 4"/>
+          <p:cNvSpPr>
+            <a:spLocks noGrp="1"/>
+          </p:cNvSpPr>
+          <p:nvPr>
+            <p:ph type="sldNum" sz="quarter" idx="12"/>
+          </p:nvPr>
+        </p:nvSpPr>
+        <p:spPr/>
+        <p:txBody>
+          <a:bodyPr/>
+          <a:lstStyle/>
+          <a:p>
+            <a:fld id="{B6F15528-21DE-4FAA-801E-634DDDAF4B2B}" type="slidenum">
+              <a:rPr lang="en-US" smtClean="0"/>
+              <a:pPr/>
+              <a:t>3</a:t>
+            </a:fld>
+            <a:endParaRPr lang="en-US"/>
+          </a:p>
+        </p:txBody>
+      </p:sp>
       <p:pic>
         <p:nvPicPr>
-          <p:cNvPr id="23558" name="Picture 6" descr="Magnifying Glass Svg Detective Glasses Svg Clipart image image 1"/>
+          <p:cNvPr id="6" name="Picture 2" descr="File:Amazon logo.svg"/>
           <p:cNvPicPr>
             <a:picLocks noChangeAspect="1" noChangeArrowheads="1"/>
           </p:cNvPicPr>
@@ -6949,8 +7202,8 @@
         </p:blipFill>
         <p:spPr bwMode="auto">
           <a:xfrm>
-            <a:off x="8077200" y="209550"/>
-            <a:ext cx="876768" cy="701168"/>
+            <a:off x="7772400" y="209550"/>
+            <a:ext cx="1199211" cy="271463"/>
           </a:xfrm>
           <a:prstGeom prst="rect">
             <a:avLst/>
@@ -6958,30 +7211,6 @@
           <a:noFill/>
         </p:spPr>
       </p:pic>
-      <p:sp>
-        <p:nvSpPr>
-          <p:cNvPr id="5" name="Slide Number Placeholder 4"/>
-          <p:cNvSpPr>
-            <a:spLocks noGrp="1"/>
-          </p:cNvSpPr>
-          <p:nvPr>
-            <p:ph type="sldNum" sz="quarter" idx="12"/>
-          </p:nvPr>
-        </p:nvSpPr>
-        <p:spPr/>
-        <p:txBody>
-          <a:bodyPr/>
-          <a:lstStyle/>
-          <a:p>
-            <a:fld id="{B6F15528-21DE-4FAA-801E-634DDDAF4B2B}" type="slidenum">
-              <a:rPr lang="en-US" smtClean="0"/>
-              <a:pPr/>
-              <a:t>3</a:t>
-            </a:fld>
-            <a:endParaRPr lang="en-US"/>
-          </a:p>
-        </p:txBody>
-      </p:sp>
     </p:spTree>
   </p:cSld>
   <p:clrMapOvr>
@@ -7054,7 +7283,15 @@
           <a:p>
             <a:r>
               <a:rPr lang="en-US" sz="2000" dirty="0" smtClean="0"/>
-              <a:t>The Roman Urdu data set is a limited corpus containing 20,229 records</a:t>
+              <a:t>The </a:t>
+            </a:r>
+            <a:r>
+              <a:rPr lang="en-US" sz="2000" i="1" dirty="0" smtClean="0"/>
+              <a:t>Roman Urdu</a:t>
+            </a:r>
+            <a:r>
+              <a:rPr lang="en-US" sz="2000" dirty="0" smtClean="0"/>
+              <a:t> data set is a limited corpus containing 20,229 records</a:t>
             </a:r>
           </a:p>
           <a:p>
@@ -7315,6 +7552,32 @@
           </a:p>
         </p:txBody>
       </p:sp>
+      <p:pic>
+        <p:nvPicPr>
+          <p:cNvPr id="8" name="Picture 2" descr="File:Amazon logo.svg"/>
+          <p:cNvPicPr>
+            <a:picLocks noChangeAspect="1" noChangeArrowheads="1"/>
+          </p:cNvPicPr>
+          <p:nvPr/>
+        </p:nvPicPr>
+        <p:blipFill>
+          <a:blip r:embed="rId4" cstate="print"/>
+          <a:srcRect/>
+          <a:stretch>
+            <a:fillRect/>
+          </a:stretch>
+        </p:blipFill>
+        <p:spPr bwMode="auto">
+          <a:xfrm>
+            <a:off x="7772400" y="209550"/>
+            <a:ext cx="1199211" cy="271463"/>
+          </a:xfrm>
+          <a:prstGeom prst="rect">
+            <a:avLst/>
+          </a:prstGeom>
+          <a:noFill/>
+        </p:spPr>
+      </p:pic>
     </p:spTree>
   </p:cSld>
   <p:clrMapOvr>
@@ -7377,7 +7640,7 @@
         </p:nvGraphicFramePr>
         <p:xfrm>
           <a:off x="1435100" y="1085850"/>
-          <a:ext cx="7499350" cy="2946400"/>
+          <a:ext cx="7499350" cy="2458720"/>
         </p:xfrm>
         <a:graphic>
           <a:graphicData uri="http://schemas.openxmlformats.org/drawingml/2006/table">
@@ -7750,96 +8013,6 @@
                           <a:ea typeface="Times New Roman"/>
                           <a:cs typeface="Times New Roman"/>
                         </a:rPr>
-                        <a:t>All blank rows have a ‘Neutral’ </a:t>
-                      </a:r>
-                      <a:r>
-                        <a:rPr lang="en-US" sz="1600" dirty="0" smtClean="0">
-                          <a:solidFill>
-                            <a:srgbClr val="222222"/>
-                          </a:solidFill>
-                          <a:latin typeface="Arial"/>
-                          <a:ea typeface="Times New Roman"/>
-                          <a:cs typeface="Times New Roman"/>
-                        </a:rPr>
-                        <a:t>sentiment</a:t>
-                      </a:r>
-                      <a:endParaRPr lang="en-US" sz="1600" dirty="0">
-                        <a:latin typeface="Calibri"/>
-                        <a:ea typeface="Times New Roman"/>
-                        <a:cs typeface="Times New Roman"/>
-                      </a:endParaRPr>
-                    </a:p>
-                  </a:txBody>
-                  <a:tcPr marL="68580" marR="68580" marT="0" marB="0"/>
-                </a:tc>
-                <a:tc>
-                  <a:txBody>
-                    <a:bodyPr/>
-                    <a:lstStyle/>
-                    <a:p>
-                      <a:pPr marL="0" marR="0">
-                        <a:spcBef>
-                          <a:spcPts val="2400"/>
-                        </a:spcBef>
-                        <a:spcAft>
-                          <a:spcPts val="2400"/>
-                        </a:spcAft>
-                      </a:pPr>
-                      <a:r>
-                        <a:rPr lang="en-US" sz="1600" dirty="0">
-                          <a:solidFill>
-                            <a:srgbClr val="222222"/>
-                          </a:solidFill>
-                          <a:latin typeface="Arial"/>
-                          <a:ea typeface="Times New Roman"/>
-                          <a:cs typeface="Times New Roman"/>
-                        </a:rPr>
-                        <a:t>Nothing. Blank answers are valid responses and imply ‘Neutral’ </a:t>
-                      </a:r>
-                      <a:r>
-                        <a:rPr lang="en-US" sz="1600" dirty="0" smtClean="0">
-                          <a:solidFill>
-                            <a:srgbClr val="222222"/>
-                          </a:solidFill>
-                          <a:latin typeface="Arial"/>
-                          <a:ea typeface="Times New Roman"/>
-                          <a:cs typeface="Times New Roman"/>
-                        </a:rPr>
-                        <a:t>sentiment</a:t>
-                      </a:r>
-                      <a:endParaRPr lang="en-US" sz="1600" dirty="0">
-                        <a:latin typeface="Calibri"/>
-                        <a:ea typeface="Times New Roman"/>
-                        <a:cs typeface="Times New Roman"/>
-                      </a:endParaRPr>
-                    </a:p>
-                  </a:txBody>
-                  <a:tcPr marL="68580" marR="68580" marT="0" marB="0"/>
-                </a:tc>
-              </a:tr>
-              <a:tr h="370840">
-                <a:tc>
-                  <a:txBody>
-                    <a:bodyPr/>
-                    <a:lstStyle/>
-                    <a:p>
-                      <a:pPr marL="0" marR="0">
-                        <a:spcBef>
-                          <a:spcPts val="2400"/>
-                        </a:spcBef>
-                        <a:spcAft>
-                          <a:spcPts val="2400"/>
-                        </a:spcAft>
-                      </a:pPr>
-                      <a:r>
-                        <a:rPr lang="en-US" sz="1600" dirty="0">
-                          <a:solidFill>
-                            <a:srgbClr val="222222"/>
-                          </a:solidFill>
-                          <a:latin typeface="Arial"/>
-                          <a:ea typeface="Times New Roman"/>
-                          <a:cs typeface="Times New Roman"/>
-                        </a:rPr>
                         <a:t>The 3</a:t>
                       </a:r>
                       <a:r>
@@ -8053,7 +8226,7 @@
         </p:nvSpPr>
         <p:spPr>
           <a:xfrm>
-            <a:off x="1447800" y="4400550"/>
+            <a:off x="1447800" y="4248150"/>
             <a:ext cx="7010400" cy="369332"/>
           </a:xfrm>
           <a:prstGeom prst="rect">
@@ -8102,6 +8275,32 @@
           </a:p>
         </p:txBody>
       </p:sp>
+      <p:pic>
+        <p:nvPicPr>
+          <p:cNvPr id="7" name="Picture 2" descr="File:Amazon logo.svg"/>
+          <p:cNvPicPr>
+            <a:picLocks noChangeAspect="1" noChangeArrowheads="1"/>
+          </p:cNvPicPr>
+          <p:nvPr/>
+        </p:nvPicPr>
+        <p:blipFill>
+          <a:blip r:embed="rId3" cstate="print"/>
+          <a:srcRect/>
+          <a:stretch>
+            <a:fillRect/>
+          </a:stretch>
+        </p:blipFill>
+        <p:spPr bwMode="auto">
+          <a:xfrm>
+            <a:off x="7772400" y="209550"/>
+            <a:ext cx="1199211" cy="271463"/>
+          </a:xfrm>
+          <a:prstGeom prst="rect">
+            <a:avLst/>
+          </a:prstGeom>
+          <a:noFill/>
+        </p:spPr>
+      </p:pic>
     </p:spTree>
   </p:cSld>
   <p:clrMapOvr>
@@ -8173,11 +8372,7 @@
             </a:r>
             <a:r>
               <a:rPr lang="en-US" dirty="0" smtClean="0"/>
-              <a:t> While language detection is supported for the Urdu language itself by </a:t>
-            </a:r>
-            <a:r>
-              <a:rPr lang="en-US" dirty="0" smtClean="0"/>
-              <a:t>Python’s ‘</a:t>
+              <a:t> While language detection is supported for the Urdu language itself by Python’s ‘</a:t>
             </a:r>
             <a:r>
               <a:rPr lang="en-US" dirty="0" err="1" smtClean="0"/>
@@ -8185,35 +8380,7 @@
             </a:r>
             <a:r>
               <a:rPr lang="en-US" dirty="0" smtClean="0"/>
-              <a:t>’ </a:t>
-            </a:r>
-            <a:r>
-              <a:rPr lang="en-US" dirty="0" smtClean="0"/>
-              <a:t>and </a:t>
-            </a:r>
-            <a:r>
-              <a:rPr lang="en-US" dirty="0" smtClean="0"/>
-              <a:t>the AWS</a:t>
-            </a:r>
-            <a:r>
-              <a:rPr lang="en-US" dirty="0" smtClean="0"/>
-              <a:t>’ </a:t>
-            </a:r>
-            <a:r>
-              <a:rPr lang="en-US" dirty="0" smtClean="0"/>
-              <a:t>Comprehend service, </a:t>
-            </a:r>
-            <a:r>
-              <a:rPr lang="en-US" dirty="0" smtClean="0"/>
-              <a:t>no commonly known package or service </a:t>
-            </a:r>
-            <a:r>
-              <a:rPr lang="en-US" dirty="0" smtClean="0"/>
-              <a:t>supports </a:t>
-            </a:r>
-            <a:r>
-              <a:rPr lang="en-US" dirty="0" smtClean="0"/>
-              <a:t>the </a:t>
+              <a:t>’ and the AWS’ Comprehend service, no commonly known package or service supports the </a:t>
             </a:r>
             <a:r>
               <a:rPr lang="en-US" i="1" dirty="0" smtClean="0"/>
@@ -8256,16 +8423,25 @@
           <a:p>
             <a:pPr lvl="1"/>
             <a:r>
+              <a:rPr lang="en-US" i="1" dirty="0" smtClean="0"/>
+              <a:t>Roman Urdu</a:t>
+            </a:r>
+            <a:r>
               <a:rPr lang="en-US" dirty="0" smtClean="0"/>
-              <a:t>Roman Urdu: 18,870*</a:t>
+              <a:t>: 18,870*</a:t>
             </a:r>
           </a:p>
           <a:p>
             <a:pPr lvl="1"/>
             <a:r>
               <a:rPr lang="en-US" dirty="0" smtClean="0"/>
-              <a:t>Other languages removed: 778</a:t>
-            </a:r>
+              <a:t>Other languages removed: </a:t>
+            </a:r>
+            <a:r>
+              <a:rPr lang="en-US" dirty="0" smtClean="0"/>
+              <a:t>778*</a:t>
+            </a:r>
+            <a:endParaRPr lang="en-US" dirty="0" smtClean="0"/>
           </a:p>
           <a:p>
             <a:endParaRPr lang="en-US" dirty="0" smtClean="0"/>
@@ -8304,9 +8480,33 @@
           </a:p>
         </p:txBody>
       </p:sp>
+      <p:sp>
+        <p:nvSpPr>
+          <p:cNvPr id="6" name="Slide Number Placeholder 5"/>
+          <p:cNvSpPr>
+            <a:spLocks noGrp="1"/>
+          </p:cNvSpPr>
+          <p:nvPr>
+            <p:ph type="sldNum" sz="quarter" idx="12"/>
+          </p:nvPr>
+        </p:nvSpPr>
+        <p:spPr/>
+        <p:txBody>
+          <a:bodyPr/>
+          <a:lstStyle/>
+          <a:p>
+            <a:fld id="{B6F15528-21DE-4FAA-801E-634DDDAF4B2B}" type="slidenum">
+              <a:rPr lang="en-US" smtClean="0"/>
+              <a:pPr/>
+              <a:t>6</a:t>
+            </a:fld>
+            <a:endParaRPr lang="en-US"/>
+          </a:p>
+        </p:txBody>
+      </p:sp>
       <p:pic>
         <p:nvPicPr>
-          <p:cNvPr id="37890" name="Picture 2" descr="File:OpenAI Logo.svg - Wikipedia"/>
+          <p:cNvPr id="7" name="Picture 2" descr="File:Amazon logo.svg"/>
           <p:cNvPicPr>
             <a:picLocks noChangeAspect="1" noChangeArrowheads="1"/>
           </p:cNvPicPr>
@@ -8321,8 +8521,8 @@
         </p:blipFill>
         <p:spPr bwMode="auto">
           <a:xfrm>
-            <a:off x="7848600" y="209550"/>
-            <a:ext cx="1078411" cy="292089"/>
+            <a:off x="7772400" y="209550"/>
+            <a:ext cx="1199211" cy="271463"/>
           </a:xfrm>
           <a:prstGeom prst="rect">
             <a:avLst/>
@@ -8330,30 +8530,6 @@
           <a:noFill/>
         </p:spPr>
       </p:pic>
-      <p:sp>
-        <p:nvSpPr>
-          <p:cNvPr id="6" name="Slide Number Placeholder 5"/>
-          <p:cNvSpPr>
-            <a:spLocks noGrp="1"/>
-          </p:cNvSpPr>
-          <p:nvPr>
-            <p:ph type="sldNum" sz="quarter" idx="12"/>
-          </p:nvPr>
-        </p:nvSpPr>
-        <p:spPr/>
-        <p:txBody>
-          <a:bodyPr/>
-          <a:lstStyle/>
-          <a:p>
-            <a:fld id="{B6F15528-21DE-4FAA-801E-634DDDAF4B2B}" type="slidenum">
-              <a:rPr lang="en-US" smtClean="0"/>
-              <a:pPr/>
-              <a:t>6</a:t>
-            </a:fld>
-            <a:endParaRPr lang="en-US"/>
-          </a:p>
-        </p:txBody>
-      </p:sp>
     </p:spTree>
   </p:cSld>
   <p:clrMapOvr>
@@ -8490,47 +8666,7 @@
             </a:pPr>
             <a:r>
               <a:rPr lang="en-US" sz="2400" dirty="0" smtClean="0"/>
-              <a:t>Text length </a:t>
-            </a:r>
-            <a:r>
-              <a:rPr lang="en-US" sz="2400" dirty="0" smtClean="0"/>
-              <a:t>was discovered </a:t>
-            </a:r>
-            <a:r>
-              <a:rPr lang="en-US" sz="2400" dirty="0" smtClean="0"/>
-              <a:t>to </a:t>
-            </a:r>
-            <a:r>
-              <a:rPr lang="en-US" sz="2400" dirty="0" smtClean="0"/>
-              <a:t>be a differentiating feature between </a:t>
-            </a:r>
-            <a:r>
-              <a:rPr lang="en-US" sz="2400" dirty="0" smtClean="0"/>
-              <a:t>Neutral sentiments </a:t>
-            </a:r>
-            <a:r>
-              <a:rPr lang="en-US" sz="2400" dirty="0" smtClean="0"/>
-              <a:t>and </a:t>
-            </a:r>
-            <a:r>
-              <a:rPr lang="en-US" sz="2400" dirty="0" smtClean="0"/>
-              <a:t>Positive or Negative </a:t>
-            </a:r>
-            <a:r>
-              <a:rPr lang="en-US" sz="2400" dirty="0" smtClean="0"/>
-              <a:t>sentiments, </a:t>
-            </a:r>
-            <a:r>
-              <a:rPr lang="en-US" sz="2400" dirty="0" smtClean="0"/>
-              <a:t>as seen </a:t>
-            </a:r>
-            <a:r>
-              <a:rPr lang="en-US" sz="2400" dirty="0" smtClean="0"/>
-              <a:t>in chart on </a:t>
-            </a:r>
-            <a:r>
-              <a:rPr lang="en-US" sz="2400" dirty="0" smtClean="0"/>
-              <a:t>right.</a:t>
+              <a:t>Text length was discovered to be a differentiating feature between Neutral sentiments and Positive or Negative sentiments, as seen in chart on right.</a:t>
             </a:r>
           </a:p>
           <a:p>
@@ -8605,6 +8741,32 @@
           </a:p>
         </p:txBody>
       </p:sp>
+      <p:pic>
+        <p:nvPicPr>
+          <p:cNvPr id="6" name="Picture 2" descr="File:Amazon logo.svg"/>
+          <p:cNvPicPr>
+            <a:picLocks noChangeAspect="1" noChangeArrowheads="1"/>
+          </p:cNvPicPr>
+          <p:nvPr/>
+        </p:nvPicPr>
+        <p:blipFill>
+          <a:blip r:embed="rId4" cstate="print"/>
+          <a:srcRect/>
+          <a:stretch>
+            <a:fillRect/>
+          </a:stretch>
+        </p:blipFill>
+        <p:spPr bwMode="auto">
+          <a:xfrm>
+            <a:off x="7772400" y="209550"/>
+            <a:ext cx="1199211" cy="271463"/>
+          </a:xfrm>
+          <a:prstGeom prst="rect">
+            <a:avLst/>
+          </a:prstGeom>
+          <a:noFill/>
+        </p:spPr>
+      </p:pic>
     </p:spTree>
   </p:cSld>
   <p:clrMapOvr>
@@ -8717,56 +8879,6 @@
               <a:rPr lang="en-US" sz="1800" dirty="0" smtClean="0"/>
               <a:t>Metrics shown below.</a:t>
             </a:r>
-          </a:p>
-          <a:p>
-            <a:pPr>
-              <a:spcAft>
-                <a:spcPts val="300"/>
-              </a:spcAft>
-            </a:pPr>
-            <a:endParaRPr lang="en-US" dirty="0" smtClean="0"/>
-          </a:p>
-          <a:p>
-            <a:pPr>
-              <a:spcAft>
-                <a:spcPts val="300"/>
-              </a:spcAft>
-            </a:pPr>
-            <a:endParaRPr lang="en-US" dirty="0" smtClean="0"/>
-          </a:p>
-          <a:p>
-            <a:pPr>
-              <a:spcAft>
-                <a:spcPts val="300"/>
-              </a:spcAft>
-            </a:pPr>
-            <a:endParaRPr lang="en-US" dirty="0" smtClean="0"/>
-          </a:p>
-          <a:p>
-            <a:pPr>
-              <a:spcAft>
-                <a:spcPts val="300"/>
-              </a:spcAft>
-            </a:pPr>
-            <a:endParaRPr lang="en-US" dirty="0" smtClean="0"/>
-          </a:p>
-          <a:p>
-            <a:pPr>
-              <a:spcAft>
-                <a:spcPts val="300"/>
-              </a:spcAft>
-              <a:buNone/>
-            </a:pPr>
-            <a:endParaRPr lang="en-US" dirty="0" smtClean="0"/>
-          </a:p>
-          <a:p>
-            <a:endParaRPr lang="en-US" dirty="0" smtClean="0"/>
-          </a:p>
-          <a:p>
-            <a:endParaRPr lang="en-US" dirty="0" smtClean="0"/>
-          </a:p>
-          <a:p>
-            <a:pPr lvl="1"/>
             <a:endParaRPr lang="en-US" dirty="0"/>
           </a:p>
         </p:txBody>
@@ -9598,6 +9710,32 @@
           </a:p>
         </p:txBody>
       </p:sp>
+      <p:pic>
+        <p:nvPicPr>
+          <p:cNvPr id="11" name="Picture 2" descr="File:Amazon logo.svg"/>
+          <p:cNvPicPr>
+            <a:picLocks noChangeAspect="1" noChangeArrowheads="1"/>
+          </p:cNvPicPr>
+          <p:nvPr/>
+        </p:nvPicPr>
+        <p:blipFill>
+          <a:blip r:embed="rId3" cstate="print"/>
+          <a:srcRect/>
+          <a:stretch>
+            <a:fillRect/>
+          </a:stretch>
+        </p:blipFill>
+        <p:spPr bwMode="auto">
+          <a:xfrm>
+            <a:off x="7772400" y="209550"/>
+            <a:ext cx="1199211" cy="271463"/>
+          </a:xfrm>
+          <a:prstGeom prst="rect">
+            <a:avLst/>
+          </a:prstGeom>
+          <a:noFill/>
+        </p:spPr>
+      </p:pic>
     </p:spTree>
   </p:cSld>
   <p:clrMapOvr>
@@ -9678,15 +9816,7 @@
             </a:r>
             <a:r>
               <a:rPr lang="en-US" dirty="0" smtClean="0"/>
-              <a:t> had the </a:t>
-            </a:r>
-            <a:r>
-              <a:rPr lang="en-US" dirty="0" smtClean="0"/>
-              <a:t>best performance </a:t>
-            </a:r>
-            <a:r>
-              <a:rPr lang="en-US" dirty="0" smtClean="0"/>
-              <a:t>of all the models (64.9% Accuracy). </a:t>
+              <a:t> had the best performance of all the models (64.9% Accuracy). </a:t>
             </a:r>
           </a:p>
           <a:p>
@@ -10015,6 +10145,32 @@
           </a:p>
         </p:txBody>
       </p:sp>
+      <p:pic>
+        <p:nvPicPr>
+          <p:cNvPr id="12" name="Picture 2" descr="File:Amazon logo.svg"/>
+          <p:cNvPicPr>
+            <a:picLocks noChangeAspect="1" noChangeArrowheads="1"/>
+          </p:cNvPicPr>
+          <p:nvPr/>
+        </p:nvPicPr>
+        <p:blipFill>
+          <a:blip r:embed="rId4" cstate="print"/>
+          <a:srcRect/>
+          <a:stretch>
+            <a:fillRect/>
+          </a:stretch>
+        </p:blipFill>
+        <p:spPr bwMode="auto">
+          <a:xfrm>
+            <a:off x="7772400" y="209550"/>
+            <a:ext cx="1199211" cy="271463"/>
+          </a:xfrm>
+          <a:prstGeom prst="rect">
+            <a:avLst/>
+          </a:prstGeom>
+          <a:noFill/>
+        </p:spPr>
+      </p:pic>
     </p:spTree>
   </p:cSld>
   <p:clrMapOvr>

</xml_diff>